<commit_message>
add solution for fourth lesson
</commit_message>
<xml_diff>
--- a/004/lesson_4.pptx
+++ b/004/lesson_4.pptx
@@ -28,7 +28,7 @@
   <p:notesSz cx="6858000" cy="9144000"/>
   <p:embeddedFontLst>
     <p:embeddedFont>
-      <p:font typeface="Abril Fatface" panose="02000503000000020003" pitchFamily="2" charset="77"/>
+      <p:font typeface="Abril Fatface" panose="020B0604020202020204" charset="0"/>
       <p:regular r:id="rId18"/>
     </p:embeddedFont>
     <p:embeddedFont>
@@ -46,7 +46,7 @@
       <p:boldItalic r:id="rId26"/>
     </p:embeddedFont>
     <p:embeddedFont>
-      <p:font typeface="Roboto Mono" pitchFamily="49" charset="0"/>
+      <p:font typeface="Roboto Mono" panose="020B0604020202020204" charset="0"/>
       <p:regular r:id="rId27"/>
       <p:bold r:id="rId28"/>
       <p:italic r:id="rId29"/>
@@ -9466,7 +9466,7 @@
             </a:pPr>
             <a:fld id="{00000000-1234-1234-1234-123412341234}" type="slidenum">
               <a:rPr lang="en"/>
-              <a:t>‹#›</a:t>
+              <a:t>‹Nr.›</a:t>
             </a:fld>
             <a:endParaRPr/>
           </a:p>
@@ -18502,7 +18502,15 @@
             </a:r>
             <a:r>
               <a:rPr lang="en-US" sz="1600" dirty="0"/>
-              <a:t> warden. </a:t>
+              <a:t> </a:t>
+            </a:r>
+            <a:r>
+              <a:rPr lang="en-US" sz="1600" dirty="0" err="1"/>
+              <a:t>werden</a:t>
+            </a:r>
+            <a:r>
+              <a:rPr lang="en-US" sz="1600" dirty="0"/>
+              <a:t>. </a:t>
             </a:r>
             <a:r>
               <a:rPr lang="en-US" sz="1600" dirty="0" err="1"/>
@@ -18618,11 +18626,11 @@
             </a:r>
             <a:r>
               <a:rPr lang="en-US" sz="1600" dirty="0" err="1"/>
-              <a:t>Nummer</a:t>
+              <a:t>Kunden</a:t>
             </a:r>
             <a:r>
               <a:rPr lang="en-US" sz="1600" dirty="0"/>
-              <a:t> (</a:t>
+              <a:t>-Nr. (</a:t>
             </a:r>
             <a:r>
               <a:rPr lang="en-US" sz="1600" dirty="0" err="1"/>
@@ -18922,11 +18930,27 @@
             </a:r>
             <a:r>
               <a:rPr lang="en-US" sz="1600" dirty="0" err="1"/>
-              <a:t>Transaktion</a:t>
+              <a:t>Überweisung</a:t>
             </a:r>
             <a:r>
               <a:rPr lang="en-US" sz="1600" dirty="0"/>
-              <a:t> in Form des </a:t>
+              <a:t> </a:t>
+            </a:r>
+            <a:r>
+              <a:rPr lang="en-US" sz="1600" dirty="0" err="1"/>
+              <a:t>wird</a:t>
+            </a:r>
+            <a:r>
+              <a:rPr lang="en-US" sz="1600" dirty="0"/>
+              <a:t> </a:t>
+            </a:r>
+            <a:r>
+              <a:rPr lang="en-US" sz="1600" dirty="0" err="1"/>
+              <a:t>mit</a:t>
+            </a:r>
+            <a:r>
+              <a:rPr lang="en-US" sz="1600" dirty="0"/>
+              <a:t> dem </a:t>
             </a:r>
             <a:r>
               <a:rPr lang="en-US" sz="1600" dirty="0" err="1"/>
@@ -18946,7 +18970,7 @@
             </a:r>
             <a:r>
               <a:rPr lang="en-US" sz="1600" dirty="0" err="1"/>
-              <a:t>Liste</a:t>
+              <a:t>Transaktionsliste</a:t>
             </a:r>
             <a:r>
               <a:rPr lang="en-US" sz="1600" dirty="0"/>
@@ -18955,14 +18979,6 @@
             <a:r>
               <a:rPr lang="en-US" sz="1600" dirty="0" err="1"/>
               <a:t>gespeichert</a:t>
-            </a:r>
-            <a:r>
-              <a:rPr lang="en-US" sz="1600" dirty="0"/>
-              <a:t> </a:t>
-            </a:r>
-            <a:r>
-              <a:rPr lang="en-US" sz="1600" dirty="0" err="1"/>
-              <a:t>werden</a:t>
             </a:r>
             <a:r>
               <a:rPr lang="en-US" sz="1600" dirty="0"/>
@@ -19021,7 +19037,7 @@
             </a:r>
             <a:r>
               <a:rPr lang="en-US" sz="1600" dirty="0"/>
-              <a:t> und </a:t>
+              <a:t> </a:t>
             </a:r>
             <a:r>
               <a:rPr lang="en-US" sz="1600" dirty="0" err="1"/>
@@ -22644,8 +22660,8 @@
         </p:nvSpPr>
         <p:spPr>
           <a:xfrm>
-            <a:off x="2957063" y="3606287"/>
-            <a:ext cx="1647825" cy="400110"/>
+            <a:off x="2686639" y="3606287"/>
+            <a:ext cx="1918249" cy="400110"/>
           </a:xfrm>
           <a:prstGeom prst="rect">
             <a:avLst/>
@@ -22667,7 +22683,7 @@
                 <a:ea typeface="Roboto Mono"/>
                 <a:sym typeface="Roboto Mono"/>
               </a:rPr>
-              <a:t>Attribute</a:t>
+              <a:t>Funktionen</a:t>
             </a:r>
           </a:p>
         </p:txBody>

</xml_diff>